<commit_message>
Revised & cleaned ScenerioMode - added PowerPoint and Output CSV
</commit_message>
<xml_diff>
--- a/PowerPoint/P1 - CoffeeShopAnalysis.pptx
+++ b/PowerPoint/P1 - CoffeeShopAnalysis.pptx
@@ -11,8 +11,9 @@
     <p:sldId id="261" r:id="rId5"/>
     <p:sldId id="262" r:id="rId6"/>
     <p:sldId id="263" r:id="rId7"/>
-    <p:sldId id="259" r:id="rId8"/>
-    <p:sldId id="260" r:id="rId9"/>
+    <p:sldId id="264" r:id="rId8"/>
+    <p:sldId id="259" r:id="rId9"/>
+    <p:sldId id="260" r:id="rId10"/>
   </p:sldIdLst>
   <p:sldSz cx="12192000" cy="6858000"/>
   <p:notesSz cx="6858000" cy="9144000"/>
@@ -10766,7 +10767,7 @@
                 </a:solidFill>
                 <a:latin typeface="Calibri" panose="020F0502020204030204"/>
               </a:rPr>
-              <a:t>Branch 1 would need to invest in more supplies &amp; equipment to meet demand, or invest in a marketing campaign to attract more business.</a:t>
+              <a:t>Branch 1 would need to invest in more supplies &amp; equipment to meet demand or invest in a marketing campaign to attract more business.</a:t>
             </a:r>
           </a:p>
         </p:txBody>
@@ -11174,6 +11175,423 @@
           <p:cNvPr id="2" name="Title 1">
             <a:extLst>
               <a:ext uri="{FF2B5EF4-FFF2-40B4-BE49-F238E27FC236}">
+                <a16:creationId xmlns:a16="http://schemas.microsoft.com/office/drawing/2014/main" id="{8CE624BE-8DE1-41C0-AEF0-BC4264BEA0E4}"/>
+              </a:ext>
+            </a:extLst>
+          </p:cNvPr>
+          <p:cNvSpPr>
+            <a:spLocks noGrp="1"/>
+          </p:cNvSpPr>
+          <p:nvPr>
+            <p:ph type="title"/>
+          </p:nvPr>
+        </p:nvSpPr>
+        <p:spPr>
+          <a:xfrm>
+            <a:off x="6289158" y="803325"/>
+            <a:ext cx="5259707" cy="1325563"/>
+          </a:xfrm>
+        </p:spPr>
+        <p:txBody>
+          <a:bodyPr>
+            <a:normAutofit/>
+          </a:bodyPr>
+          <a:lstStyle/>
+          <a:p>
+            <a:r>
+              <a:rPr lang="en-US" dirty="0"/>
+              <a:t>Summary of Future Analysis</a:t>
+            </a:r>
+          </a:p>
+        </p:txBody>
+      </p:sp>
+      <p:sp>
+        <p:nvSpPr>
+          <p:cNvPr id="71" name="Freeform: Shape 70">
+            <a:extLst>
+              <a:ext uri="{FF2B5EF4-FFF2-40B4-BE49-F238E27FC236}">
+                <a16:creationId xmlns:a16="http://schemas.microsoft.com/office/drawing/2014/main" id="{357DD0D3-F869-46D0-944C-6EC60E19E351}"/>
+              </a:ext>
+              <a:ext uri="{C183D7F6-B498-43B3-948B-1728B52AA6E4}">
+                <adec:decorative xmlns:adec="http://schemas.microsoft.com/office/drawing/2017/decorative" val="1"/>
+              </a:ext>
+            </a:extLst>
+          </p:cNvPr>
+          <p:cNvSpPr>
+            <a:spLocks noGrp="1" noRot="1" noChangeAspect="1" noMove="1" noResize="1" noEditPoints="1" noAdjustHandles="1" noChangeArrowheads="1" noChangeShapeType="1" noTextEdit="1"/>
+          </p:cNvSpPr>
+          <p:nvPr>
+            <p:extLst>
+              <p:ext uri="{386F3935-93C4-4BCD-93E2-E3B085C9AB24}">
+                <p16:designElem xmlns:p16="http://schemas.microsoft.com/office/powerpoint/2015/main" val="1"/>
+              </p:ext>
+            </p:extLst>
+          </p:nvPr>
+        </p:nvSpPr>
+        <p:spPr>
+          <a:xfrm>
+            <a:off x="0" y="0"/>
+            <a:ext cx="6136816" cy="5254922"/>
+          </a:xfrm>
+          <a:custGeom>
+            <a:avLst/>
+            <a:gdLst>
+              <a:gd name="connsiteX0" fmla="*/ 0 w 6136816"/>
+              <a:gd name="connsiteY0" fmla="*/ 0 h 5254922"/>
+              <a:gd name="connsiteX1" fmla="*/ 6136816 w 6136816"/>
+              <a:gd name="connsiteY1" fmla="*/ 0 h 5254922"/>
+              <a:gd name="connsiteX2" fmla="*/ 6134892 w 6136816"/>
+              <a:gd name="connsiteY2" fmla="*/ 111520 h 5254922"/>
+              <a:gd name="connsiteX3" fmla="*/ 6066513 w 6136816"/>
+              <a:gd name="connsiteY3" fmla="*/ 752995 h 5254922"/>
+              <a:gd name="connsiteX4" fmla="*/ 140712 w 6136816"/>
+              <a:gd name="connsiteY4" fmla="*/ 5219363 h 5254922"/>
+              <a:gd name="connsiteX5" fmla="*/ 0 w 6136816"/>
+              <a:gd name="connsiteY5" fmla="*/ 5199534 h 5254922"/>
+            </a:gdLst>
+            <a:ahLst/>
+            <a:cxnLst>
+              <a:cxn ang="0">
+                <a:pos x="connsiteX0" y="connsiteY0"/>
+              </a:cxn>
+              <a:cxn ang="0">
+                <a:pos x="connsiteX1" y="connsiteY1"/>
+              </a:cxn>
+              <a:cxn ang="0">
+                <a:pos x="connsiteX2" y="connsiteY2"/>
+              </a:cxn>
+              <a:cxn ang="0">
+                <a:pos x="connsiteX3" y="connsiteY3"/>
+              </a:cxn>
+              <a:cxn ang="0">
+                <a:pos x="connsiteX4" y="connsiteY4"/>
+              </a:cxn>
+              <a:cxn ang="0">
+                <a:pos x="connsiteX5" y="connsiteY5"/>
+              </a:cxn>
+            </a:cxnLst>
+            <a:rect l="l" t="t" r="r" b="b"/>
+            <a:pathLst>
+              <a:path w="6136816" h="5254922">
+                <a:moveTo>
+                  <a:pt x="0" y="0"/>
+                </a:moveTo>
+                <a:lnTo>
+                  <a:pt x="6136816" y="0"/>
+                </a:lnTo>
+                <a:lnTo>
+                  <a:pt x="6134892" y="111520"/>
+                </a:lnTo>
+                <a:cubicBezTo>
+                  <a:pt x="6124961" y="323936"/>
+                  <a:pt x="6102367" y="538040"/>
+                  <a:pt x="6066513" y="752995"/>
+                </a:cubicBezTo>
+                <a:cubicBezTo>
+                  <a:pt x="5592281" y="3596146"/>
+                  <a:pt x="2972232" y="5545369"/>
+                  <a:pt x="140712" y="5219363"/>
+                </a:cubicBezTo>
+                <a:lnTo>
+                  <a:pt x="0" y="5199534"/>
+                </a:lnTo>
+                <a:close/>
+              </a:path>
+            </a:pathLst>
+          </a:custGeom>
+          <a:solidFill>
+            <a:schemeClr val="tx1">
+              <a:alpha val="80000"/>
+            </a:schemeClr>
+          </a:solidFill>
+          <a:ln>
+            <a:noFill/>
+          </a:ln>
+        </p:spPr>
+        <p:style>
+          <a:lnRef idx="2">
+            <a:schemeClr val="accent1">
+              <a:shade val="50000"/>
+            </a:schemeClr>
+          </a:lnRef>
+          <a:fillRef idx="1">
+            <a:schemeClr val="accent1"/>
+          </a:fillRef>
+          <a:effectRef idx="0">
+            <a:schemeClr val="accent1"/>
+          </a:effectRef>
+          <a:fontRef idx="minor">
+            <a:schemeClr val="lt1"/>
+          </a:fontRef>
+        </p:style>
+        <p:txBody>
+          <a:bodyPr wrap="square" rtlCol="0" anchor="ctr">
+            <a:noAutofit/>
+          </a:bodyPr>
+          <a:lstStyle/>
+          <a:p>
+            <a:pPr algn="ctr"/>
+            <a:endParaRPr lang="en-US" dirty="0"/>
+          </a:p>
+        </p:txBody>
+      </p:sp>
+      <p:pic>
+        <p:nvPicPr>
+          <p:cNvPr id="3074" name="Picture 2" descr="Technology Talent Development | Technology Solutions | Revature">
+            <a:extLst>
+              <a:ext uri="{FF2B5EF4-FFF2-40B4-BE49-F238E27FC236}">
+                <a16:creationId xmlns:a16="http://schemas.microsoft.com/office/drawing/2014/main" id="{DA58A854-E2E7-4CE5-ACE2-EB59B0AB4969}"/>
+              </a:ext>
+            </a:extLst>
+          </p:cNvPr>
+          <p:cNvPicPr>
+            <a:picLocks noChangeAspect="1" noChangeArrowheads="1"/>
+          </p:cNvPicPr>
+          <p:nvPr/>
+        </p:nvPicPr>
+        <p:blipFill rotWithShape="1">
+          <a:blip r:embed="rId2">
+            <a:extLst>
+              <a:ext uri="{28A0092B-C50C-407E-A947-70E740481C1C}">
+                <a14:useLocalDpi xmlns:a14="http://schemas.microsoft.com/office/drawing/2010/main" val="0"/>
+              </a:ext>
+            </a:extLst>
+          </a:blip>
+          <a:srcRect t="14984" r="22" b="22"/>
+          <a:stretch/>
+        </p:blipFill>
+        <p:spPr bwMode="auto">
+          <a:xfrm>
+            <a:off x="1" y="2"/>
+            <a:ext cx="5863721" cy="4984915"/>
+          </a:xfrm>
+          <a:custGeom>
+            <a:avLst/>
+            <a:gdLst/>
+            <a:ahLst/>
+            <a:cxnLst/>
+            <a:rect l="l" t="t" r="r" b="b"/>
+            <a:pathLst>
+              <a:path w="5863721" h="4984915">
+                <a:moveTo>
+                  <a:pt x="0" y="0"/>
+                </a:moveTo>
+                <a:lnTo>
+                  <a:pt x="5863721" y="0"/>
+                </a:lnTo>
+                <a:lnTo>
+                  <a:pt x="5844576" y="326138"/>
+                </a:lnTo>
+                <a:cubicBezTo>
+                  <a:pt x="5833049" y="448313"/>
+                  <a:pt x="5817094" y="570952"/>
+                  <a:pt x="5796589" y="693884"/>
+                </a:cubicBezTo>
+                <a:cubicBezTo>
+                  <a:pt x="5344573" y="3403845"/>
+                  <a:pt x="2847261" y="5261756"/>
+                  <a:pt x="148386" y="4951022"/>
+                </a:cubicBezTo>
+                <a:lnTo>
+                  <a:pt x="0" y="4930112"/>
+                </a:lnTo>
+                <a:close/>
+              </a:path>
+            </a:pathLst>
+          </a:custGeom>
+          <a:noFill/>
+          <a:extLst>
+            <a:ext uri="{909E8E84-426E-40DD-AFC4-6F175D3DCCD1}">
+              <a14:hiddenFill xmlns:a14="http://schemas.microsoft.com/office/drawing/2010/main">
+                <a:solidFill>
+                  <a:srgbClr val="FFFFFF"/>
+                </a:solidFill>
+              </a14:hiddenFill>
+            </a:ext>
+          </a:extLst>
+        </p:spPr>
+      </p:pic>
+      <p:sp>
+        <p:nvSpPr>
+          <p:cNvPr id="3" name="Content Placeholder 2">
+            <a:extLst>
+              <a:ext uri="{FF2B5EF4-FFF2-40B4-BE49-F238E27FC236}">
+                <a16:creationId xmlns:a16="http://schemas.microsoft.com/office/drawing/2014/main" id="{2506EA69-C68D-4077-8032-8CE4634DB3E2}"/>
+              </a:ext>
+            </a:extLst>
+          </p:cNvPr>
+          <p:cNvSpPr>
+            <a:spLocks noGrp="1"/>
+          </p:cNvSpPr>
+          <p:nvPr>
+            <p:ph idx="1"/>
+          </p:nvPr>
+        </p:nvSpPr>
+        <p:spPr>
+          <a:xfrm>
+            <a:off x="6289158" y="2279018"/>
+            <a:ext cx="5259714" cy="3375920"/>
+          </a:xfrm>
+        </p:spPr>
+        <p:txBody>
+          <a:bodyPr anchor="t">
+            <a:normAutofit/>
+          </a:bodyPr>
+          <a:lstStyle/>
+          <a:p>
+            <a:pPr marL="0" indent="0">
+              <a:buNone/>
+              <a:defRPr/>
+            </a:pPr>
+            <a:r>
+              <a:rPr lang="en-US" sz="1600" dirty="0">
+                <a:solidFill>
+                  <a:prstClr val="white"/>
+                </a:solidFill>
+                <a:latin typeface="Calibri" panose="020F0502020204030204"/>
+              </a:rPr>
+              <a:t>Solution Cont.:</a:t>
+            </a:r>
+          </a:p>
+          <a:p>
+            <a:pPr marL="0" indent="0">
+              <a:buNone/>
+              <a:defRPr/>
+            </a:pPr>
+            <a:r>
+              <a:rPr lang="en-US" sz="1600" dirty="0">
+                <a:solidFill>
+                  <a:prstClr val="white"/>
+                </a:solidFill>
+                <a:latin typeface="Calibri" panose="020F0502020204030204"/>
+              </a:rPr>
+              <a:t>Recap - Branch 1 would need to invest in more supplies &amp; equipment to meet demand or invest in a marketing campaign to attract more business.</a:t>
+            </a:r>
+          </a:p>
+          <a:p>
+            <a:pPr marL="0" indent="0">
+              <a:buNone/>
+              <a:defRPr/>
+            </a:pPr>
+            <a:r>
+              <a:rPr lang="en-US" sz="1600" dirty="0">
+                <a:solidFill>
+                  <a:prstClr val="white"/>
+                </a:solidFill>
+                <a:latin typeface="Calibri" panose="020F0502020204030204"/>
+              </a:rPr>
+              <a:t>Disclaimer - Price is not a variable in this future query, but this is a representation of what could potentially happen in a realistic scenario.</a:t>
+            </a:r>
+          </a:p>
+          <a:p>
+            <a:pPr>
+              <a:defRPr/>
+            </a:pPr>
+            <a:r>
+              <a:rPr lang="en-US" sz="1600" dirty="0">
+                <a:solidFill>
+                  <a:prstClr val="white"/>
+                </a:solidFill>
+                <a:latin typeface="Calibri" panose="020F0502020204030204"/>
+              </a:rPr>
+              <a:t> assuming that an extraneous factor like a shortage is possibly hindering Branch 1’s inventory.</a:t>
+            </a:r>
+          </a:p>
+        </p:txBody>
+      </p:sp>
+      <p:pic>
+        <p:nvPicPr>
+          <p:cNvPr id="1026" name="Picture 2" descr="Supply shock - Wikiwand">
+            <a:extLst>
+              <a:ext uri="{FF2B5EF4-FFF2-40B4-BE49-F238E27FC236}">
+                <a16:creationId xmlns:a16="http://schemas.microsoft.com/office/drawing/2014/main" id="{11EB630D-4BDA-4965-934C-7890565CC878}"/>
+              </a:ext>
+            </a:extLst>
+          </p:cNvPr>
+          <p:cNvPicPr>
+            <a:picLocks noChangeAspect="1" noChangeArrowheads="1"/>
+          </p:cNvPicPr>
+          <p:nvPr/>
+        </p:nvPicPr>
+        <p:blipFill>
+          <a:blip r:embed="rId3">
+            <a:extLst>
+              <a:ext uri="{28A0092B-C50C-407E-A947-70E740481C1C}">
+                <a14:useLocalDpi xmlns:a14="http://schemas.microsoft.com/office/drawing/2010/main" val="0"/>
+              </a:ext>
+            </a:extLst>
+          </a:blip>
+          <a:srcRect/>
+          <a:stretch>
+            <a:fillRect/>
+          </a:stretch>
+        </p:blipFill>
+        <p:spPr bwMode="auto">
+          <a:xfrm>
+            <a:off x="438550" y="777991"/>
+            <a:ext cx="5259715" cy="5302018"/>
+          </a:xfrm>
+          <a:prstGeom prst="rect">
+            <a:avLst/>
+          </a:prstGeom>
+          <a:noFill/>
+          <a:extLst>
+            <a:ext uri="{909E8E84-426E-40DD-AFC4-6F175D3DCCD1}">
+              <a14:hiddenFill xmlns:a14="http://schemas.microsoft.com/office/drawing/2010/main">
+                <a:solidFill>
+                  <a:srgbClr val="FFFFFF"/>
+                </a:solidFill>
+              </a14:hiddenFill>
+            </a:ext>
+          </a:extLst>
+        </p:spPr>
+      </p:pic>
+    </p:spTree>
+    <p:extLst>
+      <p:ext uri="{BB962C8B-B14F-4D97-AF65-F5344CB8AC3E}">
+        <p14:creationId xmlns:p14="http://schemas.microsoft.com/office/powerpoint/2010/main" val="834259820"/>
+      </p:ext>
+    </p:extLst>
+  </p:cSld>
+  <p:clrMapOvr>
+    <a:overrideClrMapping bg1="dk1" tx1="lt1" bg2="dk2" tx2="lt2" accent1="accent1" accent2="accent2" accent3="accent3" accent4="accent4" accent5="accent5" accent6="accent6" hlink="hlink" folHlink="folHlink"/>
+  </p:clrMapOvr>
+</p:sld>
+</file>
+
+<file path=ppt/slides/slide8.xml><?xml version="1.0" encoding="utf-8"?>
+<p:sld xmlns:a="http://schemas.openxmlformats.org/drawingml/2006/main" xmlns:r="http://schemas.openxmlformats.org/officeDocument/2006/relationships" xmlns:p="http://schemas.openxmlformats.org/presentationml/2006/main">
+  <p:cSld>
+    <p:bg>
+      <p:bgPr>
+        <a:solidFill>
+          <a:schemeClr val="bg1">
+            <a:tint val="95000"/>
+            <a:satMod val="170000"/>
+          </a:schemeClr>
+        </a:solidFill>
+        <a:effectLst/>
+      </p:bgPr>
+    </p:bg>
+    <p:spTree>
+      <p:nvGrpSpPr>
+        <p:cNvPr id="1" name=""/>
+        <p:cNvGrpSpPr/>
+        <p:nvPr/>
+      </p:nvGrpSpPr>
+      <p:grpSpPr>
+        <a:xfrm>
+          <a:off x="0" y="0"/>
+          <a:ext cx="0" cy="0"/>
+          <a:chOff x="0" y="0"/>
+          <a:chExt cx="0" cy="0"/>
+        </a:xfrm>
+      </p:grpSpPr>
+      <p:sp>
+        <p:nvSpPr>
+          <p:cNvPr id="2" name="Title 1">
+            <a:extLst>
+              <a:ext uri="{FF2B5EF4-FFF2-40B4-BE49-F238E27FC236}">
                 <a16:creationId xmlns:a16="http://schemas.microsoft.com/office/drawing/2014/main" id="{9DD9D60C-5CB7-4946-B13F-06C5F20D0063}"/>
               </a:ext>
             </a:extLst>
@@ -11199,8 +11617,12 @@
           <a:p>
             <a:pPr algn="ctr"/>
             <a:r>
+              <a:rPr lang="en-US"/>
+              <a:t>Tech </a:t>
+            </a:r>
+            <a:r>
               <a:rPr lang="en-US" dirty="0"/>
-              <a:t>SCL Tech Demo</a:t>
+              <a:t>Demo</a:t>
             </a:r>
           </a:p>
         </p:txBody>
@@ -11496,7 +11918,7 @@
 </p:sld>
 </file>
 
-<file path=ppt/slides/slide8.xml><?xml version="1.0" encoding="utf-8"?>
+<file path=ppt/slides/slide9.xml><?xml version="1.0" encoding="utf-8"?>
 <p:sld xmlns:a="http://schemas.openxmlformats.org/drawingml/2006/main" xmlns:r="http://schemas.openxmlformats.org/officeDocument/2006/relationships" xmlns:p="http://schemas.openxmlformats.org/presentationml/2006/main">
   <p:cSld>
     <p:bg>

</xml_diff>